<commit_message>
Added Flutteristas logo; updated some wording
</commit_message>
<xml_diff>
--- a/Introduction_to_Flutteristas.pptx
+++ b/Introduction_to_Flutteristas.pptx
@@ -2183,7 +2183,7 @@
           </a:ln>
           <a:extLst>
             <a:ext uri="{C572A759-6A51-4108-AA02-DFA0A04FC94B}">
-              <ma14:wrappingTextBoxFlag xmlns:ma14="http://schemas.microsoft.com/office/mac/drawingml/2011/main" xmlns="" val="1"/>
+              <ma14:wrappingTextBoxFlag xmlns="" xmlns:ma14="http://schemas.microsoft.com/office/mac/drawingml/2011/main" val="1"/>
             </a:ext>
           </a:extLst>
         </p:spPr>
@@ -2222,7 +2222,7 @@
           </a:ln>
           <a:extLst>
             <a:ext uri="{C572A759-6A51-4108-AA02-DFA0A04FC94B}">
-              <ma14:wrappingTextBoxFlag xmlns:ma14="http://schemas.microsoft.com/office/mac/drawingml/2011/main" xmlns="" val="1"/>
+              <ma14:wrappingTextBoxFlag xmlns="" xmlns:ma14="http://schemas.microsoft.com/office/mac/drawingml/2011/main" val="1"/>
             </a:ext>
           </a:extLst>
         </p:spPr>
@@ -3061,7 +3061,7 @@
     <p:bg>
       <p:bgPr>
         <a:solidFill>
-          <a:srgbClr val="006BAB"/>
+          <a:schemeClr val="tx1"/>
         </a:solidFill>
         <a:effectLst/>
       </p:bgPr>
@@ -3114,14 +3114,32 @@
           </a:lstStyle>
           <a:p>
             <a:r>
-              <a:rPr dirty="0"/>
+              <a:rPr dirty="0">
+                <a:solidFill>
+                  <a:schemeClr val="accent1">
+                    <a:lumMod val="75000"/>
+                  </a:schemeClr>
+                </a:solidFill>
+              </a:rPr>
               <a:t>Introduction to Flutter</a:t>
             </a:r>
             <a:r>
-              <a:rPr lang="en-US" dirty="0"/>
+              <a:rPr lang="en-US" dirty="0">
+                <a:solidFill>
+                  <a:schemeClr val="accent1">
+                    <a:lumMod val="75000"/>
+                  </a:schemeClr>
+                </a:solidFill>
+              </a:rPr>
               <a:t>istas Community</a:t>
             </a:r>
-            <a:endParaRPr dirty="0"/>
+            <a:endParaRPr dirty="0">
+              <a:solidFill>
+                <a:schemeClr val="accent1">
+                  <a:lumMod val="75000"/>
+                </a:schemeClr>
+              </a:solidFill>
+            </a:endParaRPr>
           </a:p>
         </p:txBody>
       </p:sp>
@@ -3144,8 +3162,47 @@
         </p:blipFill>
         <p:spPr>
           <a:xfrm>
-            <a:off x="5105190" y="648296"/>
-            <a:ext cx="2794426" cy="2531706"/>
+            <a:off x="635820" y="7749996"/>
+            <a:ext cx="1635432" cy="1481675"/>
+          </a:xfrm>
+          <a:prstGeom prst="rect">
+            <a:avLst/>
+          </a:prstGeom>
+          <a:ln w="12700">
+            <a:miter lim="400000"/>
+          </a:ln>
+        </p:spPr>
+      </p:pic>
+      <p:pic>
+        <p:nvPicPr>
+          <p:cNvPr id="4" name="Image Gallery">
+            <a:extLst>
+              <a:ext uri="{FF2B5EF4-FFF2-40B4-BE49-F238E27FC236}">
+                <a16:creationId xmlns:a16="http://schemas.microsoft.com/office/drawing/2014/main" id="{F10CF787-41B3-6D45-9D15-5D4B6545F9B1}"/>
+              </a:ext>
+            </a:extLst>
+          </p:cNvPr>
+          <p:cNvPicPr>
+            <a:picLocks noChangeAspect="1"/>
+          </p:cNvPicPr>
+          <p:nvPr/>
+        </p:nvPicPr>
+        <p:blipFill>
+          <a:blip r:embed="rId3">
+            <a:extLst>
+              <a:ext uri="{28A0092B-C50C-407E-A947-70E740481C1C}">
+                <a14:useLocalDpi xmlns:a14="http://schemas.microsoft.com/office/drawing/2010/main" val="0"/>
+              </a:ext>
+            </a:extLst>
+          </a:blip>
+          <a:stretch>
+            <a:fillRect/>
+          </a:stretch>
+        </p:blipFill>
+        <p:spPr>
+          <a:xfrm>
+            <a:off x="9999406" y="7397937"/>
+            <a:ext cx="2281086" cy="1833734"/>
           </a:xfrm>
           <a:prstGeom prst="rect">
             <a:avLst/>
@@ -3170,7 +3227,7 @@
     <p:bg>
       <p:bgPr>
         <a:solidFill>
-          <a:srgbClr val="006BAB"/>
+          <a:schemeClr val="tx1"/>
         </a:solidFill>
         <a:effectLst/>
       </p:bgPr>
@@ -3223,31 +3280,73 @@
           </a:lstStyle>
           <a:p>
             <a:r>
-              <a:rPr sz="4799" dirty="0"/>
+              <a:rPr sz="4799" dirty="0">
+                <a:solidFill>
+                  <a:schemeClr val="accent1">
+                    <a:lumMod val="75000"/>
+                  </a:schemeClr>
+                </a:solidFill>
+              </a:rPr>
               <a:t>What </a:t>
             </a:r>
             <a:r>
-              <a:rPr lang="en-US" sz="4799" dirty="0"/>
+              <a:rPr lang="en-US" sz="4799" dirty="0">
+                <a:solidFill>
+                  <a:schemeClr val="accent1">
+                    <a:lumMod val="75000"/>
+                  </a:schemeClr>
+                </a:solidFill>
+              </a:rPr>
               <a:t>are</a:t>
             </a:r>
             <a:r>
-              <a:rPr sz="4799" dirty="0"/>
+              <a:rPr sz="4799" dirty="0">
+                <a:solidFill>
+                  <a:schemeClr val="accent1">
+                    <a:lumMod val="75000"/>
+                  </a:schemeClr>
+                </a:solidFill>
+              </a:rPr>
               <a:t> </a:t>
             </a:r>
             <a:r>
-              <a:rPr lang="en-US" sz="4799" dirty="0"/>
+              <a:rPr lang="en-US" sz="4799" dirty="0">
+                <a:solidFill>
+                  <a:schemeClr val="accent1">
+                    <a:lumMod val="75000"/>
+                  </a:schemeClr>
+                </a:solidFill>
+              </a:rPr>
               <a:t>the </a:t>
             </a:r>
             <a:r>
-              <a:rPr sz="4799" dirty="0"/>
+              <a:rPr sz="4799" dirty="0">
+                <a:solidFill>
+                  <a:schemeClr val="accent1">
+                    <a:lumMod val="75000"/>
+                  </a:schemeClr>
+                </a:solidFill>
+              </a:rPr>
               <a:t>Flutter</a:t>
             </a:r>
             <a:r>
-              <a:rPr lang="en-US" sz="4799" dirty="0"/>
+              <a:rPr lang="en-US" sz="4799" dirty="0">
+                <a:solidFill>
+                  <a:schemeClr val="accent1">
+                    <a:lumMod val="75000"/>
+                  </a:schemeClr>
+                </a:solidFill>
+              </a:rPr>
               <a:t>istas</a:t>
             </a:r>
             <a:r>
-              <a:rPr sz="4799" dirty="0"/>
+              <a:rPr sz="4799" dirty="0">
+                <a:solidFill>
+                  <a:schemeClr val="accent1">
+                    <a:lumMod val="75000"/>
+                  </a:schemeClr>
+                </a:solidFill>
+              </a:rPr>
               <a:t>?</a:t>
             </a:r>
           </a:p>
@@ -3266,7 +3365,7 @@
         <p:spPr>
           <a:xfrm>
             <a:off x="693968" y="1347526"/>
-            <a:ext cx="11616866" cy="7902575"/>
+            <a:ext cx="11616866" cy="5628461"/>
           </a:xfrm>
           <a:prstGeom prst="rect">
             <a:avLst/>
@@ -3286,20 +3385,14 @@
               </a:defRPr>
             </a:pPr>
             <a:r>
-              <a:rPr lang="en-US" dirty="0"/>
-              <a:t>The </a:t>
-            </a:r>
-            <a:r>
-              <a:rPr dirty="0" err="1"/>
-              <a:t>Flutter</a:t>
-            </a:r>
-            <a:r>
-              <a:rPr lang="en-US" dirty="0" err="1"/>
-              <a:t>istas</a:t>
-            </a:r>
-            <a:r>
-              <a:rPr lang="en-US" dirty="0"/>
-              <a:t> is a world-wide community of people who identify as women or non-binary who have an interest in the Flutter SDK.</a:t>
+              <a:rPr lang="en-US" dirty="0">
+                <a:solidFill>
+                  <a:schemeClr val="accent1">
+                    <a:lumMod val="75000"/>
+                  </a:schemeClr>
+                </a:solidFill>
+              </a:rPr>
+              <a:t>The Flutteristas is a world-wide community of people whose gender identity is either female or non-binary and have an interest in the Flutter SDK.</a:t>
             </a:r>
           </a:p>
           <a:p>
@@ -3311,18 +3404,22 @@
               </a:defRPr>
             </a:pPr>
             <a:r>
-              <a:rPr lang="en-US" dirty="0"/>
-              <a:t>The </a:t>
-            </a:r>
-            <a:r>
-              <a:rPr lang="en-US" dirty="0" err="1"/>
-              <a:t>Flutteristas</a:t>
-            </a:r>
-            <a:r>
-              <a:rPr lang="en-US" dirty="0"/>
-              <a:t> have a monthly meeting which usually includes a presentation by Google Flutter team member(s) or other Flutter Community member(s).  </a:t>
-            </a:r>
-            <a:endParaRPr dirty="0"/>
+              <a:rPr lang="en-US" dirty="0">
+                <a:solidFill>
+                  <a:schemeClr val="accent1">
+                    <a:lumMod val="75000"/>
+                  </a:schemeClr>
+                </a:solidFill>
+              </a:rPr>
+              <a:t>The Flutteristas have a monthly meeting which usually includes a presentation by Flutter Community member(s).</a:t>
+            </a:r>
+            <a:endParaRPr dirty="0">
+              <a:solidFill>
+                <a:schemeClr val="accent1">
+                  <a:lumMod val="75000"/>
+                </a:schemeClr>
+              </a:solidFill>
+            </a:endParaRPr>
           </a:p>
         </p:txBody>
       </p:sp>
@@ -3380,55 +3477,28 @@
                                   </p:childTnLst>
                                 </p:cTn>
                               </p:par>
+                            </p:childTnLst>
+                          </p:cTn>
+                        </p:par>
+                        <p:par>
+                          <p:cTn id="7" fill="hold">
+                            <p:stCondLst>
+                              <p:cond delay="0"/>
+                            </p:stCondLst>
+                            <p:childTnLst>
                               <p:par>
-                                <p:cTn id="7" presetID="1" presetClass="entr" presetSubtype="0" fill="hold" grpId="1" nodeType="withEffect">
+                                <p:cTn id="8" presetID="1" presetClass="entr" presetSubtype="0" fill="hold" grpId="1" nodeType="afterEffect">
                                   <p:stCondLst>
                                     <p:cond delay="0"/>
                                   </p:stCondLst>
                                   <p:childTnLst>
                                     <p:set>
                                       <p:cBhvr>
-                                        <p:cTn id="8" fill="hold"/>
+                                        <p:cTn id="9" fill="hold"/>
                                         <p:tgtEl>
                                           <p:spTgt spid="124">
                                             <p:txEl>
                                               <p:pRg st="0" end="0"/>
-                                            </p:txEl>
-                                          </p:spTgt>
-                                        </p:tgtEl>
-                                        <p:attrNameLst>
-                                          <p:attrName>style.visibility</p:attrName>
-                                        </p:attrNameLst>
-                                      </p:cBhvr>
-                                      <p:to>
-                                        <p:strVal val="visible"/>
-                                      </p:to>
-                                    </p:set>
-                                  </p:childTnLst>
-                                </p:cTn>
-                              </p:par>
-                            </p:childTnLst>
-                          </p:cTn>
-                        </p:par>
-                        <p:par>
-                          <p:cTn id="9" fill="hold">
-                            <p:stCondLst>
-                              <p:cond delay="0"/>
-                            </p:stCondLst>
-                            <p:childTnLst>
-                              <p:par>
-                                <p:cTn id="10" presetID="1" presetClass="entr" presetSubtype="0" fill="hold" grpId="1" nodeType="afterEffect">
-                                  <p:stCondLst>
-                                    <p:cond delay="0"/>
-                                  </p:stCondLst>
-                                  <p:childTnLst>
-                                    <p:set>
-                                      <p:cBhvr>
-                                        <p:cTn id="11" fill="hold"/>
-                                        <p:tgtEl>
-                                          <p:spTgt spid="124">
-                                            <p:txEl>
-                                              <p:pRg st="1" end="1"/>
                                             </p:txEl>
                                           </p:spTgt>
                                         </p:tgtEl>
@@ -3483,7 +3553,7 @@
     <p:bg>
       <p:bgPr>
         <a:solidFill>
-          <a:srgbClr val="006BAB"/>
+          <a:schemeClr val="tx1"/>
         </a:solidFill>
         <a:effectLst/>
       </p:bgPr>
@@ -3536,10 +3606,22 @@
           </a:lstStyle>
           <a:p>
             <a:r>
-              <a:rPr lang="en-US" dirty="0"/>
+              <a:rPr lang="en-US" dirty="0">
+                <a:solidFill>
+                  <a:schemeClr val="accent1">
+                    <a:lumMod val="75000"/>
+                  </a:schemeClr>
+                </a:solidFill>
+              </a:rPr>
               <a:t>Interested in joining?</a:t>
             </a:r>
-            <a:endParaRPr dirty="0"/>
+            <a:endParaRPr dirty="0">
+              <a:solidFill>
+                <a:schemeClr val="accent1">
+                  <a:lumMod val="75000"/>
+                </a:schemeClr>
+              </a:solidFill>
+            </a:endParaRPr>
           </a:p>
         </p:txBody>
       </p:sp>
@@ -3579,16 +3661,14 @@
               </a:defRPr>
             </a:pPr>
             <a:r>
-              <a:rPr lang="en-US" sz="3999" dirty="0"/>
-              <a:t>Are you interested in joining the </a:t>
-            </a:r>
-            <a:r>
-              <a:rPr lang="en-US" sz="3999" dirty="0" err="1"/>
-              <a:t>Flutteristas</a:t>
-            </a:r>
-            <a:r>
-              <a:rPr lang="en-US" sz="3999" dirty="0"/>
-              <a:t>?</a:t>
+              <a:rPr lang="en-US" sz="3999" dirty="0">
+                <a:solidFill>
+                  <a:schemeClr val="accent1">
+                    <a:lumMod val="75000"/>
+                  </a:schemeClr>
+                </a:solidFill>
+              </a:rPr>
+              <a:t>Are you interested in joining the Flutteristas?</a:t>
             </a:r>
           </a:p>
           <a:p>
@@ -3603,8 +3683,14 @@
               </a:defRPr>
             </a:pPr>
             <a:r>
-              <a:rPr lang="en-US" sz="3999" dirty="0"/>
-              <a:t>Do you identify as a woman or non-binary who has an interest in the Flutter SDK?</a:t>
+              <a:rPr lang="en-US" sz="3999" dirty="0">
+                <a:solidFill>
+                  <a:schemeClr val="accent1">
+                    <a:lumMod val="75000"/>
+                  </a:schemeClr>
+                </a:solidFill>
+              </a:rPr>
+              <a:t>Do you identify* as a woman or non-binary who has an interest in the Flutter SDK?</a:t>
             </a:r>
           </a:p>
           <a:p>
@@ -3619,16 +3705,14 @@
               </a:defRPr>
             </a:pPr>
             <a:r>
-              <a:rPr lang="en-US" sz="3999" dirty="0"/>
-              <a:t>Do you agree to the </a:t>
-            </a:r>
-            <a:r>
-              <a:rPr lang="en-US" sz="3999" dirty="0" err="1"/>
-              <a:t>Flutteristas</a:t>
-            </a:r>
-            <a:r>
-              <a:rPr lang="en-US" sz="3999" dirty="0"/>
-              <a:t>’ Code of Conduct (see appendix)?</a:t>
+              <a:rPr lang="en-US" sz="3999" dirty="0">
+                <a:solidFill>
+                  <a:schemeClr val="accent1">
+                    <a:lumMod val="75000"/>
+                  </a:schemeClr>
+                </a:solidFill>
+              </a:rPr>
+              <a:t>Do you agree to the Flutteristas’ Code of Conduct (see next slide)?</a:t>
             </a:r>
           </a:p>
           <a:p>
@@ -3643,32 +3727,54 @@
               </a:defRPr>
             </a:pPr>
             <a:r>
-              <a:rPr lang="en-US" sz="3999" dirty="0"/>
-              <a:t>If you answered yes to all three of these questions, contact the presenter or send an email to </a:t>
-            </a:r>
-            <a:r>
-              <a:rPr lang="en-US" sz="3999" dirty="0" err="1"/>
-              <a:t>Flutteristas@gmail.com</a:t>
-            </a:r>
-            <a:r>
-              <a:rPr lang="en-US" sz="3999" dirty="0"/>
-              <a:t>.  It’s recommended to use a </a:t>
-            </a:r>
-            <a:r>
-              <a:rPr lang="en-US" sz="3999" dirty="0" err="1"/>
+              <a:rPr lang="en-US" sz="3999" dirty="0">
+                <a:solidFill>
+                  <a:schemeClr val="accent1">
+                    <a:lumMod val="75000"/>
+                  </a:schemeClr>
+                </a:solidFill>
+              </a:rPr>
+              <a:t>If you answered “yes” to all three of these questions, send an email to </a:t>
+            </a:r>
+            <a:r>
+              <a:rPr lang="en-US" sz="3999" dirty="0" err="1">
+                <a:solidFill>
+                  <a:schemeClr val="accent1">
+                    <a:lumMod val="75000"/>
+                  </a:schemeClr>
+                </a:solidFill>
+              </a:rPr>
+              <a:t>flutteristas@gmail.com</a:t>
+            </a:r>
+            <a:r>
+              <a:rPr lang="en-US" sz="3999" dirty="0">
+                <a:solidFill>
+                  <a:schemeClr val="accent1">
+                    <a:lumMod val="75000"/>
+                  </a:schemeClr>
+                </a:solidFill>
+              </a:rPr>
+              <a:t>.  It is recommended to use a </a:t>
+            </a:r>
+            <a:r>
+              <a:rPr lang="en-US" sz="3999" dirty="0" err="1">
+                <a:solidFill>
+                  <a:schemeClr val="accent1">
+                    <a:lumMod val="75000"/>
+                  </a:schemeClr>
+                </a:solidFill>
+              </a:rPr>
               <a:t>gmail</a:t>
             </a:r>
             <a:r>
-              <a:rPr lang="en-US" sz="3999" dirty="0"/>
-              <a:t> account so that you can be added to the </a:t>
-            </a:r>
-            <a:r>
-              <a:rPr lang="en-US" sz="3999" dirty="0" err="1"/>
-              <a:t>Flutteristas</a:t>
-            </a:r>
-            <a:r>
-              <a:rPr lang="en-US" sz="3999" dirty="0"/>
-              <a:t> calendar.</a:t>
+              <a:rPr lang="en-US" sz="3999" dirty="0">
+                <a:solidFill>
+                  <a:schemeClr val="accent1">
+                    <a:lumMod val="75000"/>
+                  </a:schemeClr>
+                </a:solidFill>
+              </a:rPr>
+              <a:t> account so that you can be added to the Flutteristas calendar.</a:t>
             </a:r>
           </a:p>
         </p:txBody>
@@ -3688,7 +3794,7 @@
     <p:bg>
       <p:bgPr>
         <a:solidFill>
-          <a:srgbClr val="006BAB"/>
+          <a:schemeClr val="tx1"/>
         </a:solidFill>
         <a:effectLst/>
       </p:bgPr>
@@ -3735,6 +3841,13 @@
           </a:lstStyle>
           <a:p>
             <a:r>
+              <a:rPr dirty="0">
+                <a:solidFill>
+                  <a:schemeClr val="accent1">
+                    <a:lumMod val="75000"/>
+                  </a:schemeClr>
+                </a:solidFill>
+              </a:rPr>
               <a:t>Questions?</a:t>
             </a:r>
           </a:p>
@@ -3755,7 +3868,7 @@
     <p:bg>
       <p:bgPr>
         <a:solidFill>
-          <a:srgbClr val="006BAB"/>
+          <a:schemeClr val="tx1"/>
         </a:solidFill>
         <a:effectLst/>
       </p:bgPr>
@@ -3802,10 +3915,22 @@
           </a:lstStyle>
           <a:p>
             <a:r>
-              <a:rPr lang="en-US" dirty="0"/>
+              <a:rPr lang="en-US" dirty="0">
+                <a:solidFill>
+                  <a:schemeClr val="accent1">
+                    <a:lumMod val="75000"/>
+                  </a:schemeClr>
+                </a:solidFill>
+              </a:rPr>
               <a:t>Appendix</a:t>
             </a:r>
-            <a:endParaRPr dirty="0"/>
+            <a:endParaRPr dirty="0">
+              <a:solidFill>
+                <a:schemeClr val="accent1">
+                  <a:lumMod val="75000"/>
+                </a:schemeClr>
+              </a:solidFill>
+            </a:endParaRPr>
           </a:p>
         </p:txBody>
       </p:sp>
@@ -3829,7 +3954,7 @@
     <p:bg>
       <p:bgPr>
         <a:solidFill>
-          <a:srgbClr val="006BAB"/>
+          <a:schemeClr val="tx1"/>
         </a:solidFill>
         <a:effectLst/>
       </p:bgPr>
@@ -3882,14 +4007,32 @@
           </a:lstStyle>
           <a:p>
             <a:r>
-              <a:rPr lang="en-US" sz="4799" dirty="0" err="1"/>
+              <a:rPr lang="en-US" sz="4799" dirty="0" err="1">
+                <a:solidFill>
+                  <a:schemeClr val="accent1">
+                    <a:lumMod val="75000"/>
+                  </a:schemeClr>
+                </a:solidFill>
+              </a:rPr>
               <a:t>Flutteristas</a:t>
             </a:r>
             <a:r>
-              <a:rPr lang="en-US" sz="4799" dirty="0"/>
+              <a:rPr lang="en-US" sz="4799" dirty="0">
+                <a:solidFill>
+                  <a:schemeClr val="accent1">
+                    <a:lumMod val="75000"/>
+                  </a:schemeClr>
+                </a:solidFill>
+              </a:rPr>
               <a:t> Code of Conduct</a:t>
             </a:r>
-            <a:endParaRPr sz="4799" dirty="0"/>
+            <a:endParaRPr sz="4799" dirty="0">
+              <a:solidFill>
+                <a:schemeClr val="accent1">
+                  <a:lumMod val="75000"/>
+                </a:schemeClr>
+              </a:solidFill>
+            </a:endParaRPr>
           </a:p>
         </p:txBody>
       </p:sp>
@@ -3926,12 +4069,14 @@
               </a:defRPr>
             </a:pPr>
             <a:r>
-              <a:rPr lang="en-US" dirty="0" err="1"/>
-              <a:t>Flutteristas</a:t>
-            </a:r>
-            <a:r>
-              <a:rPr lang="en-US" dirty="0"/>
-              <a:t> are dedicated to providing a harassment-free and inclusive experience for everyone regardless of gender identity and expression, sexual orientation, disabilities, neurodiversity, physical appearance, body size, ethnicity, nationality, race, age, religion, or other protected category. </a:t>
+              <a:rPr lang="en-US" dirty="0">
+                <a:solidFill>
+                  <a:schemeClr val="accent1">
+                    <a:lumMod val="75000"/>
+                  </a:schemeClr>
+                </a:solidFill>
+              </a:rPr>
+              <a:t>Flutteristas are dedicated to providing a harassment-free and inclusive experience for everyone regardless of gender identity and expression, sexual orientation, disabilities, neurodiversity, physical appearance, body size, ethnicity, nationality, race, age, religion, or other protected category.</a:t>
             </a:r>
           </a:p>
           <a:p>
@@ -3943,26 +4088,42 @@
               </a:defRPr>
             </a:pPr>
             <a:r>
-              <a:rPr lang="en-US" dirty="0" err="1"/>
-              <a:t>Flutteristas</a:t>
-            </a:r>
-            <a:r>
-              <a:rPr lang="en-US"/>
-              <a:t> follow </a:t>
-            </a:r>
-            <a:r>
-              <a:rPr lang="en-US" dirty="0"/>
-              <a:t>Google’s Flutter Interact Community Guidelines located at  https://</a:t>
-            </a:r>
-            <a:r>
-              <a:rPr lang="en-US" dirty="0" err="1"/>
+              <a:rPr lang="en-US" dirty="0">
+                <a:solidFill>
+                  <a:schemeClr val="accent1">
+                    <a:lumMod val="75000"/>
+                  </a:schemeClr>
+                </a:solidFill>
+              </a:rPr>
+              <a:t>Flutteristas follow Google’s Flutter Interact Community Guidelines located at  https://</a:t>
+            </a:r>
+            <a:r>
+              <a:rPr lang="en-US" dirty="0" err="1">
+                <a:solidFill>
+                  <a:schemeClr val="accent1">
+                    <a:lumMod val="75000"/>
+                  </a:schemeClr>
+                </a:solidFill>
+              </a:rPr>
               <a:t>developers.google.com</a:t>
             </a:r>
             <a:r>
-              <a:rPr lang="en-US" dirty="0"/>
+              <a:rPr lang="en-US" dirty="0">
+                <a:solidFill>
+                  <a:schemeClr val="accent1">
+                    <a:lumMod val="75000"/>
+                  </a:schemeClr>
+                </a:solidFill>
+              </a:rPr>
               <a:t>/events/flutter-interact/community-guidelines. </a:t>
             </a:r>
-            <a:endParaRPr dirty="0"/>
+            <a:endParaRPr dirty="0">
+              <a:solidFill>
+                <a:schemeClr val="accent1">
+                  <a:lumMod val="75000"/>
+                </a:schemeClr>
+              </a:solidFill>
+            </a:endParaRPr>
           </a:p>
         </p:txBody>
       </p:sp>

</xml_diff>